<commit_message>
post 3rd lecture push
</commit_message>
<xml_diff>
--- a/presentationForInterSoftwareCommunication.pptx
+++ b/presentationForInterSoftwareCommunication.pptx
@@ -5,10 +5,10 @@
     <p:sldMasterId id="2147483648" r:id="rId4"/>
   </p:sldMasterIdLst>
   <p:notesMasterIdLst>
-    <p:notesMasterId r:id="rId20"/>
+    <p:notesMasterId r:id="rId23"/>
   </p:notesMasterIdLst>
   <p:handoutMasterIdLst>
-    <p:handoutMasterId r:id="rId21"/>
+    <p:handoutMasterId r:id="rId24"/>
   </p:handoutMasterIdLst>
   <p:sldIdLst>
     <p:sldId id="256" r:id="rId5"/>
@@ -25,7 +25,10 @@
     <p:sldId id="294" r:id="rId16"/>
     <p:sldId id="295" r:id="rId17"/>
     <p:sldId id="296" r:id="rId18"/>
-    <p:sldId id="268" r:id="rId19"/>
+    <p:sldId id="298" r:id="rId19"/>
+    <p:sldId id="299" r:id="rId20"/>
+    <p:sldId id="300" r:id="rId21"/>
+    <p:sldId id="268" r:id="rId22"/>
   </p:sldIdLst>
   <p:sldSz cx="12192000" cy="6858000"/>
   <p:notesSz cx="6858000" cy="9144000"/>
@@ -240,7 +243,7 @@
           <a:p>
             <a:fld id="{1CA5457B-CDAE-4DEB-AEC8-C82DE2312E37}" type="datetimeFigureOut">
               <a:rPr lang="en-US" smtClean="0"/>
-              <a:t>4/16/2021</a:t>
+              <a:t>4/30/2021</a:t>
             </a:fld>
             <a:endParaRPr lang="en-US" dirty="0"/>
           </a:p>
@@ -417,7 +420,7 @@
           <a:p>
             <a:fld id="{090B78EA-28CE-41D8-9043-90E391E5F567}" type="datetimeFigureOut">
               <a:rPr lang="en-US" noProof="0" smtClean="0"/>
-              <a:t>4/16/2021</a:t>
+              <a:t>4/30/2021</a:t>
             </a:fld>
             <a:endParaRPr lang="en-US" noProof="0" dirty="0"/>
           </a:p>
@@ -25566,41 +25569,6 @@
           </a:p>
         </p:txBody>
       </p:sp>
-      <p:sp>
-        <p:nvSpPr>
-          <p:cNvPr id="5" name="TextBox 4">
-            <a:extLst>
-              <a:ext uri="{FF2B5EF4-FFF2-40B4-BE49-F238E27FC236}">
-                <a16:creationId xmlns:a16="http://schemas.microsoft.com/office/drawing/2014/main" id="{3644EAC8-CB01-4CE3-9E25-42C219F3DA50}"/>
-              </a:ext>
-            </a:extLst>
-          </p:cNvPr>
-          <p:cNvSpPr txBox="1"/>
-          <p:nvPr/>
-        </p:nvSpPr>
-        <p:spPr>
-          <a:xfrm>
-            <a:off x="170916" y="6301917"/>
-            <a:ext cx="5532284" cy="369332"/>
-          </a:xfrm>
-          <a:prstGeom prst="rect">
-            <a:avLst/>
-          </a:prstGeom>
-          <a:noFill/>
-        </p:spPr>
-        <p:txBody>
-          <a:bodyPr wrap="none" rtlCol="0">
-            <a:spAutoFit/>
-          </a:bodyPr>
-          <a:lstStyle/>
-          <a:p>
-            <a:r>
-              <a:rPr lang="en-US" i="1" dirty="0"/>
-              <a:t>Disclaimer: part of this presentation is opinion based</a:t>
-            </a:r>
-          </a:p>
-        </p:txBody>
-      </p:sp>
     </p:spTree>
     <p:extLst>
       <p:ext uri="{BB962C8B-B14F-4D97-AF65-F5344CB8AC3E}">
@@ -27233,7 +27201,7 @@
         <p:spPr>
           <a:xfrm>
             <a:off x="1006679" y="2650921"/>
-            <a:ext cx="7039106" cy="1200329"/>
+            <a:ext cx="7039106" cy="2308324"/>
           </a:xfrm>
           <a:prstGeom prst="rect">
             <a:avLst/>
@@ -27265,6 +27233,76 @@
               <a:buChar char="-"/>
             </a:pPr>
             <a:r>
+              <a:rPr lang="en-US" b="0" i="0" dirty="0">
+                <a:solidFill>
+                  <a:srgbClr val="202122"/>
+                </a:solidFill>
+                <a:effectLst/>
+                <a:latin typeface="Arial" panose="020B0604020202020204" pitchFamily="34" charset="0"/>
+              </a:rPr>
+              <a:t> </a:t>
+            </a:r>
+            <a:r>
+              <a:rPr lang="en-US" b="0" i="0" u="none" strike="noStrike" dirty="0">
+                <a:solidFill>
+                  <a:srgbClr val="0645AD"/>
+                </a:solidFill>
+                <a:effectLst/>
+                <a:latin typeface="Arial" panose="020B0604020202020204" pitchFamily="34" charset="0"/>
+                <a:hlinkClick r:id="rId2" tooltip="Front end and back end"/>
+              </a:rPr>
+              <a:t>Ryan Dahl</a:t>
+            </a:r>
+            <a:r>
+              <a:rPr lang="en-US" b="0" i="0" dirty="0">
+                <a:solidFill>
+                  <a:srgbClr val="202122"/>
+                </a:solidFill>
+                <a:effectLst/>
+                <a:latin typeface="Arial" panose="020B0604020202020204" pitchFamily="34" charset="0"/>
+              </a:rPr>
+              <a:t> in 2009,</a:t>
+            </a:r>
+            <a:endParaRPr lang="en-US" dirty="0">
+              <a:solidFill>
+                <a:schemeClr val="bg1"/>
+              </a:solidFill>
+            </a:endParaRPr>
+          </a:p>
+          <a:p>
+            <a:pPr marL="285750" indent="-285750">
+              <a:buFontTx/>
+              <a:buChar char="-"/>
+            </a:pPr>
+            <a:r>
+              <a:rPr lang="en-US" dirty="0">
+                <a:solidFill>
+                  <a:schemeClr val="bg1"/>
+                </a:solidFill>
+              </a:rPr>
+              <a:t>Js EVERYWHERE!</a:t>
+            </a:r>
+          </a:p>
+          <a:p>
+            <a:pPr marL="285750" indent="-285750">
+              <a:buFontTx/>
+              <a:buChar char="-"/>
+            </a:pPr>
+            <a:r>
+              <a:rPr lang="en-US" dirty="0">
+                <a:solidFill>
+                  <a:schemeClr val="bg1"/>
+                </a:solidFill>
+              </a:rPr>
+              <a:t>Unify backend and frontend</a:t>
+            </a:r>
+          </a:p>
+          <a:p>
+            <a:pPr marL="285750" indent="-285750">
+              <a:buFontTx/>
+              <a:buChar char="-"/>
+            </a:pPr>
+            <a:r>
               <a:rPr lang="en-US" dirty="0">
                 <a:solidFill>
                   <a:schemeClr val="bg1"/>
@@ -27286,6 +27324,25 @@
               </a:rPr>
               <a:t>So what's the goal? (networking apps) </a:t>
             </a:r>
+          </a:p>
+          <a:p>
+            <a:pPr marL="285750" indent="-285750">
+              <a:buFontTx/>
+              <a:buChar char="-"/>
+            </a:pPr>
+            <a:r>
+              <a:rPr lang="en-US" dirty="0" err="1">
+                <a:solidFill>
+                  <a:schemeClr val="bg1"/>
+                </a:solidFill>
+              </a:rPr>
+              <a:t>Deno</a:t>
+            </a:r>
+            <a:endParaRPr lang="en-US" dirty="0">
+              <a:solidFill>
+                <a:schemeClr val="bg1"/>
+              </a:solidFill>
+            </a:endParaRPr>
           </a:p>
           <a:p>
             <a:pPr marL="285750" indent="-285750">
@@ -27314,6 +27371,624 @@
 </file>
 
 <file path=ppt/slides/slide15.xml><?xml version="1.0" encoding="utf-8"?>
+<p:sld xmlns:a="http://schemas.openxmlformats.org/drawingml/2006/main" xmlns:r="http://schemas.openxmlformats.org/officeDocument/2006/relationships" xmlns:p="http://schemas.openxmlformats.org/presentationml/2006/main">
+  <p:cSld>
+    <p:spTree>
+      <p:nvGrpSpPr>
+        <p:cNvPr id="1" name=""/>
+        <p:cNvGrpSpPr/>
+        <p:nvPr/>
+      </p:nvGrpSpPr>
+      <p:grpSpPr>
+        <a:xfrm>
+          <a:off x="0" y="0"/>
+          <a:ext cx="0" cy="0"/>
+          <a:chOff x="0" y="0"/>
+          <a:chExt cx="0" cy="0"/>
+        </a:xfrm>
+      </p:grpSpPr>
+      <p:sp>
+        <p:nvSpPr>
+          <p:cNvPr id="2" name="Text Placeholder 1">
+            <a:extLst>
+              <a:ext uri="{FF2B5EF4-FFF2-40B4-BE49-F238E27FC236}">
+                <a16:creationId xmlns:a16="http://schemas.microsoft.com/office/drawing/2014/main" id="{A6A85A91-DC75-4288-9489-A9118B98310C}"/>
+              </a:ext>
+            </a:extLst>
+          </p:cNvPr>
+          <p:cNvSpPr>
+            <a:spLocks noGrp="1"/>
+          </p:cNvSpPr>
+          <p:nvPr>
+            <p:ph type="body" idx="1"/>
+          </p:nvPr>
+        </p:nvSpPr>
+        <p:spPr>
+          <a:xfrm>
+            <a:off x="1184188" y="1575452"/>
+            <a:ext cx="6803136" cy="365760"/>
+          </a:xfrm>
+        </p:spPr>
+        <p:txBody>
+          <a:bodyPr/>
+          <a:lstStyle/>
+          <a:p>
+            <a:r>
+              <a:rPr lang="en-US" dirty="0"/>
+              <a:t>Let’s play with node!</a:t>
+            </a:r>
+          </a:p>
+        </p:txBody>
+      </p:sp>
+      <p:sp>
+        <p:nvSpPr>
+          <p:cNvPr id="3" name="Slide Number Placeholder 2">
+            <a:extLst>
+              <a:ext uri="{FF2B5EF4-FFF2-40B4-BE49-F238E27FC236}">
+                <a16:creationId xmlns:a16="http://schemas.microsoft.com/office/drawing/2014/main" id="{8FB6AA8E-414F-4333-8578-9F132D3C2E51}"/>
+              </a:ext>
+            </a:extLst>
+          </p:cNvPr>
+          <p:cNvSpPr>
+            <a:spLocks noGrp="1"/>
+          </p:cNvSpPr>
+          <p:nvPr>
+            <p:ph type="sldNum" sz="quarter" idx="12"/>
+          </p:nvPr>
+        </p:nvSpPr>
+        <p:spPr/>
+        <p:txBody>
+          <a:bodyPr/>
+          <a:lstStyle/>
+          <a:p>
+            <a:fld id="{C263D6C4-4840-40CC-AC84-17E24B3B7BDE}" type="slidenum">
+              <a:rPr lang="en-US" noProof="0" smtClean="0"/>
+              <a:pPr/>
+              <a:t>15</a:t>
+            </a:fld>
+            <a:endParaRPr lang="en-US" noProof="0" dirty="0"/>
+          </a:p>
+        </p:txBody>
+      </p:sp>
+      <p:sp>
+        <p:nvSpPr>
+          <p:cNvPr id="4" name="Title 3">
+            <a:extLst>
+              <a:ext uri="{FF2B5EF4-FFF2-40B4-BE49-F238E27FC236}">
+                <a16:creationId xmlns:a16="http://schemas.microsoft.com/office/drawing/2014/main" id="{8C46AEC1-3F05-4E0A-98E3-4AE7A369C70D}"/>
+              </a:ext>
+            </a:extLst>
+          </p:cNvPr>
+          <p:cNvSpPr>
+            <a:spLocks noGrp="1"/>
+          </p:cNvSpPr>
+          <p:nvPr>
+            <p:ph type="title"/>
+          </p:nvPr>
+        </p:nvSpPr>
+        <p:spPr>
+          <a:xfrm>
+            <a:off x="831850" y="572548"/>
+            <a:ext cx="7781544" cy="859055"/>
+          </a:xfrm>
+        </p:spPr>
+        <p:txBody>
+          <a:bodyPr/>
+          <a:lstStyle/>
+          <a:p>
+            <a:r>
+              <a:rPr lang="en-US" dirty="0"/>
+              <a:t>Example #5:</a:t>
+            </a:r>
+          </a:p>
+        </p:txBody>
+      </p:sp>
+      <p:sp>
+        <p:nvSpPr>
+          <p:cNvPr id="5" name="TextBox 4">
+            <a:extLst>
+              <a:ext uri="{FF2B5EF4-FFF2-40B4-BE49-F238E27FC236}">
+                <a16:creationId xmlns:a16="http://schemas.microsoft.com/office/drawing/2014/main" id="{113AB8C5-A10A-46A7-8E9B-86FB564077F1}"/>
+              </a:ext>
+            </a:extLst>
+          </p:cNvPr>
+          <p:cNvSpPr txBox="1"/>
+          <p:nvPr/>
+        </p:nvSpPr>
+        <p:spPr>
+          <a:xfrm>
+            <a:off x="8011486" y="214002"/>
+            <a:ext cx="3941259" cy="307777"/>
+          </a:xfrm>
+          <a:prstGeom prst="rect">
+            <a:avLst/>
+          </a:prstGeom>
+          <a:noFill/>
+        </p:spPr>
+        <p:txBody>
+          <a:bodyPr wrap="square" rtlCol="0">
+            <a:spAutoFit/>
+          </a:bodyPr>
+          <a:lstStyle/>
+          <a:p>
+            <a:r>
+              <a:rPr lang="en-US" sz="1400" i="1" dirty="0">
+                <a:solidFill>
+                  <a:schemeClr val="bg1"/>
+                </a:solidFill>
+                <a:latin typeface="Verdana" panose="020B0604030504040204" pitchFamily="34" charset="0"/>
+                <a:ea typeface="Verdana" panose="020B0604030504040204" pitchFamily="34" charset="0"/>
+              </a:rPr>
+              <a:t>Yay we get to code! </a:t>
+            </a:r>
+          </a:p>
+        </p:txBody>
+      </p:sp>
+      <p:sp>
+        <p:nvSpPr>
+          <p:cNvPr id="7" name="TextBox 6">
+            <a:extLst>
+              <a:ext uri="{FF2B5EF4-FFF2-40B4-BE49-F238E27FC236}">
+                <a16:creationId xmlns:a16="http://schemas.microsoft.com/office/drawing/2014/main" id="{6EF4944F-46C0-43F2-B4D7-059765C14E16}"/>
+              </a:ext>
+            </a:extLst>
+          </p:cNvPr>
+          <p:cNvSpPr txBox="1"/>
+          <p:nvPr/>
+        </p:nvSpPr>
+        <p:spPr>
+          <a:xfrm>
+            <a:off x="763398" y="2424310"/>
+            <a:ext cx="7474591" cy="369332"/>
+          </a:xfrm>
+          <a:prstGeom prst="rect">
+            <a:avLst/>
+          </a:prstGeom>
+          <a:noFill/>
+        </p:spPr>
+        <p:txBody>
+          <a:bodyPr wrap="square" rtlCol="0">
+            <a:spAutoFit/>
+          </a:bodyPr>
+          <a:lstStyle/>
+          <a:p>
+            <a:r>
+              <a:rPr lang="en-US" dirty="0">
+                <a:solidFill>
+                  <a:schemeClr val="bg1"/>
+                </a:solidFill>
+              </a:rPr>
+              <a:t>Run JS Outside the browser</a:t>
+            </a:r>
+          </a:p>
+        </p:txBody>
+      </p:sp>
+    </p:spTree>
+    <p:extLst>
+      <p:ext uri="{BB962C8B-B14F-4D97-AF65-F5344CB8AC3E}">
+        <p14:creationId xmlns:p14="http://schemas.microsoft.com/office/powerpoint/2010/main" val="4210677952"/>
+      </p:ext>
+    </p:extLst>
+  </p:cSld>
+  <p:clrMapOvr>
+    <a:masterClrMapping/>
+  </p:clrMapOvr>
+</p:sld>
+</file>
+
+<file path=ppt/slides/slide16.xml><?xml version="1.0" encoding="utf-8"?>
+<p:sld xmlns:a="http://schemas.openxmlformats.org/drawingml/2006/main" xmlns:r="http://schemas.openxmlformats.org/officeDocument/2006/relationships" xmlns:p="http://schemas.openxmlformats.org/presentationml/2006/main">
+  <p:cSld>
+    <p:spTree>
+      <p:nvGrpSpPr>
+        <p:cNvPr id="1" name=""/>
+        <p:cNvGrpSpPr/>
+        <p:nvPr/>
+      </p:nvGrpSpPr>
+      <p:grpSpPr>
+        <a:xfrm>
+          <a:off x="0" y="0"/>
+          <a:ext cx="0" cy="0"/>
+          <a:chOff x="0" y="0"/>
+          <a:chExt cx="0" cy="0"/>
+        </a:xfrm>
+      </p:grpSpPr>
+      <p:sp>
+        <p:nvSpPr>
+          <p:cNvPr id="2" name="Text Placeholder 1">
+            <a:extLst>
+              <a:ext uri="{FF2B5EF4-FFF2-40B4-BE49-F238E27FC236}">
+                <a16:creationId xmlns:a16="http://schemas.microsoft.com/office/drawing/2014/main" id="{A6A85A91-DC75-4288-9489-A9118B98310C}"/>
+              </a:ext>
+            </a:extLst>
+          </p:cNvPr>
+          <p:cNvSpPr>
+            <a:spLocks noGrp="1"/>
+          </p:cNvSpPr>
+          <p:nvPr>
+            <p:ph type="body" idx="1"/>
+          </p:nvPr>
+        </p:nvSpPr>
+        <p:spPr>
+          <a:xfrm>
+            <a:off x="1184188" y="1575452"/>
+            <a:ext cx="6803136" cy="365760"/>
+          </a:xfrm>
+        </p:spPr>
+        <p:txBody>
+          <a:bodyPr/>
+          <a:lstStyle/>
+          <a:p>
+            <a:r>
+              <a:rPr lang="en-US" dirty="0"/>
+              <a:t>Introduction to node modules </a:t>
+            </a:r>
+          </a:p>
+        </p:txBody>
+      </p:sp>
+      <p:sp>
+        <p:nvSpPr>
+          <p:cNvPr id="3" name="Slide Number Placeholder 2">
+            <a:extLst>
+              <a:ext uri="{FF2B5EF4-FFF2-40B4-BE49-F238E27FC236}">
+                <a16:creationId xmlns:a16="http://schemas.microsoft.com/office/drawing/2014/main" id="{8FB6AA8E-414F-4333-8578-9F132D3C2E51}"/>
+              </a:ext>
+            </a:extLst>
+          </p:cNvPr>
+          <p:cNvSpPr>
+            <a:spLocks noGrp="1"/>
+          </p:cNvSpPr>
+          <p:nvPr>
+            <p:ph type="sldNum" sz="quarter" idx="12"/>
+          </p:nvPr>
+        </p:nvSpPr>
+        <p:spPr/>
+        <p:txBody>
+          <a:bodyPr/>
+          <a:lstStyle/>
+          <a:p>
+            <a:fld id="{C263D6C4-4840-40CC-AC84-17E24B3B7BDE}" type="slidenum">
+              <a:rPr lang="en-US" noProof="0" smtClean="0"/>
+              <a:pPr/>
+              <a:t>16</a:t>
+            </a:fld>
+            <a:endParaRPr lang="en-US" noProof="0" dirty="0"/>
+          </a:p>
+        </p:txBody>
+      </p:sp>
+      <p:sp>
+        <p:nvSpPr>
+          <p:cNvPr id="4" name="Title 3">
+            <a:extLst>
+              <a:ext uri="{FF2B5EF4-FFF2-40B4-BE49-F238E27FC236}">
+                <a16:creationId xmlns:a16="http://schemas.microsoft.com/office/drawing/2014/main" id="{8C46AEC1-3F05-4E0A-98E3-4AE7A369C70D}"/>
+              </a:ext>
+            </a:extLst>
+          </p:cNvPr>
+          <p:cNvSpPr>
+            <a:spLocks noGrp="1"/>
+          </p:cNvSpPr>
+          <p:nvPr>
+            <p:ph type="title"/>
+          </p:nvPr>
+        </p:nvSpPr>
+        <p:spPr>
+          <a:xfrm>
+            <a:off x="831850" y="572548"/>
+            <a:ext cx="7781544" cy="859055"/>
+          </a:xfrm>
+        </p:spPr>
+        <p:txBody>
+          <a:bodyPr/>
+          <a:lstStyle/>
+          <a:p>
+            <a:r>
+              <a:rPr lang="en-US" dirty="0"/>
+              <a:t>Example #6:</a:t>
+            </a:r>
+          </a:p>
+        </p:txBody>
+      </p:sp>
+      <p:sp>
+        <p:nvSpPr>
+          <p:cNvPr id="5" name="TextBox 4">
+            <a:extLst>
+              <a:ext uri="{FF2B5EF4-FFF2-40B4-BE49-F238E27FC236}">
+                <a16:creationId xmlns:a16="http://schemas.microsoft.com/office/drawing/2014/main" id="{113AB8C5-A10A-46A7-8E9B-86FB564077F1}"/>
+              </a:ext>
+            </a:extLst>
+          </p:cNvPr>
+          <p:cNvSpPr txBox="1"/>
+          <p:nvPr/>
+        </p:nvSpPr>
+        <p:spPr>
+          <a:xfrm>
+            <a:off x="8011486" y="214002"/>
+            <a:ext cx="3941259" cy="307777"/>
+          </a:xfrm>
+          <a:prstGeom prst="rect">
+            <a:avLst/>
+          </a:prstGeom>
+          <a:noFill/>
+        </p:spPr>
+        <p:txBody>
+          <a:bodyPr wrap="square" rtlCol="0">
+            <a:spAutoFit/>
+          </a:bodyPr>
+          <a:lstStyle/>
+          <a:p>
+            <a:r>
+              <a:rPr lang="en-US" sz="1400" i="1" dirty="0">
+                <a:solidFill>
+                  <a:schemeClr val="bg1"/>
+                </a:solidFill>
+                <a:latin typeface="Verdana" panose="020B0604030504040204" pitchFamily="34" charset="0"/>
+                <a:ea typeface="Verdana" panose="020B0604030504040204" pitchFamily="34" charset="0"/>
+              </a:rPr>
+              <a:t>Yay we get to code! </a:t>
+            </a:r>
+          </a:p>
+        </p:txBody>
+      </p:sp>
+      <p:sp>
+        <p:nvSpPr>
+          <p:cNvPr id="7" name="TextBox 6">
+            <a:extLst>
+              <a:ext uri="{FF2B5EF4-FFF2-40B4-BE49-F238E27FC236}">
+                <a16:creationId xmlns:a16="http://schemas.microsoft.com/office/drawing/2014/main" id="{6EF4944F-46C0-43F2-B4D7-059765C14E16}"/>
+              </a:ext>
+            </a:extLst>
+          </p:cNvPr>
+          <p:cNvSpPr txBox="1"/>
+          <p:nvPr/>
+        </p:nvSpPr>
+        <p:spPr>
+          <a:xfrm>
+            <a:off x="763398" y="2424310"/>
+            <a:ext cx="7474591" cy="369332"/>
+          </a:xfrm>
+          <a:prstGeom prst="rect">
+            <a:avLst/>
+          </a:prstGeom>
+          <a:noFill/>
+        </p:spPr>
+        <p:txBody>
+          <a:bodyPr wrap="square" rtlCol="0">
+            <a:spAutoFit/>
+          </a:bodyPr>
+          <a:lstStyle/>
+          <a:p>
+            <a:r>
+              <a:rPr lang="en-US" dirty="0">
+                <a:solidFill>
+                  <a:schemeClr val="bg1"/>
+                </a:solidFill>
+              </a:rPr>
+              <a:t>Yay! The JS ecosystem!</a:t>
+            </a:r>
+          </a:p>
+        </p:txBody>
+      </p:sp>
+    </p:spTree>
+    <p:extLst>
+      <p:ext uri="{BB962C8B-B14F-4D97-AF65-F5344CB8AC3E}">
+        <p14:creationId xmlns:p14="http://schemas.microsoft.com/office/powerpoint/2010/main" val="1364293102"/>
+      </p:ext>
+    </p:extLst>
+  </p:cSld>
+  <p:clrMapOvr>
+    <a:masterClrMapping/>
+  </p:clrMapOvr>
+</p:sld>
+</file>
+
+<file path=ppt/slides/slide17.xml><?xml version="1.0" encoding="utf-8"?>
+<p:sld xmlns:a="http://schemas.openxmlformats.org/drawingml/2006/main" xmlns:r="http://schemas.openxmlformats.org/officeDocument/2006/relationships" xmlns:p="http://schemas.openxmlformats.org/presentationml/2006/main">
+  <p:cSld>
+    <p:spTree>
+      <p:nvGrpSpPr>
+        <p:cNvPr id="1" name=""/>
+        <p:cNvGrpSpPr/>
+        <p:nvPr/>
+      </p:nvGrpSpPr>
+      <p:grpSpPr>
+        <a:xfrm>
+          <a:off x="0" y="0"/>
+          <a:ext cx="0" cy="0"/>
+          <a:chOff x="0" y="0"/>
+          <a:chExt cx="0" cy="0"/>
+        </a:xfrm>
+      </p:grpSpPr>
+      <p:sp>
+        <p:nvSpPr>
+          <p:cNvPr id="2" name="Text Placeholder 1">
+            <a:extLst>
+              <a:ext uri="{FF2B5EF4-FFF2-40B4-BE49-F238E27FC236}">
+                <a16:creationId xmlns:a16="http://schemas.microsoft.com/office/drawing/2014/main" id="{A6A85A91-DC75-4288-9489-A9118B98310C}"/>
+              </a:ext>
+            </a:extLst>
+          </p:cNvPr>
+          <p:cNvSpPr>
+            <a:spLocks noGrp="1"/>
+          </p:cNvSpPr>
+          <p:nvPr>
+            <p:ph type="body" idx="1"/>
+          </p:nvPr>
+        </p:nvSpPr>
+        <p:spPr>
+          <a:xfrm>
+            <a:off x="1184188" y="1575452"/>
+            <a:ext cx="6803136" cy="365760"/>
+          </a:xfrm>
+        </p:spPr>
+        <p:txBody>
+          <a:bodyPr/>
+          <a:lstStyle/>
+          <a:p>
+            <a:r>
+              <a:rPr lang="en-US" dirty="0"/>
+              <a:t>Our first server</a:t>
+            </a:r>
+          </a:p>
+        </p:txBody>
+      </p:sp>
+      <p:sp>
+        <p:nvSpPr>
+          <p:cNvPr id="3" name="Slide Number Placeholder 2">
+            <a:extLst>
+              <a:ext uri="{FF2B5EF4-FFF2-40B4-BE49-F238E27FC236}">
+                <a16:creationId xmlns:a16="http://schemas.microsoft.com/office/drawing/2014/main" id="{8FB6AA8E-414F-4333-8578-9F132D3C2E51}"/>
+              </a:ext>
+            </a:extLst>
+          </p:cNvPr>
+          <p:cNvSpPr>
+            <a:spLocks noGrp="1"/>
+          </p:cNvSpPr>
+          <p:nvPr>
+            <p:ph type="sldNum" sz="quarter" idx="12"/>
+          </p:nvPr>
+        </p:nvSpPr>
+        <p:spPr/>
+        <p:txBody>
+          <a:bodyPr/>
+          <a:lstStyle/>
+          <a:p>
+            <a:fld id="{C263D6C4-4840-40CC-AC84-17E24B3B7BDE}" type="slidenum">
+              <a:rPr lang="en-US" noProof="0" smtClean="0"/>
+              <a:pPr/>
+              <a:t>17</a:t>
+            </a:fld>
+            <a:endParaRPr lang="en-US" noProof="0" dirty="0"/>
+          </a:p>
+        </p:txBody>
+      </p:sp>
+      <p:sp>
+        <p:nvSpPr>
+          <p:cNvPr id="4" name="Title 3">
+            <a:extLst>
+              <a:ext uri="{FF2B5EF4-FFF2-40B4-BE49-F238E27FC236}">
+                <a16:creationId xmlns:a16="http://schemas.microsoft.com/office/drawing/2014/main" id="{8C46AEC1-3F05-4E0A-98E3-4AE7A369C70D}"/>
+              </a:ext>
+            </a:extLst>
+          </p:cNvPr>
+          <p:cNvSpPr>
+            <a:spLocks noGrp="1"/>
+          </p:cNvSpPr>
+          <p:nvPr>
+            <p:ph type="title"/>
+          </p:nvPr>
+        </p:nvSpPr>
+        <p:spPr>
+          <a:xfrm>
+            <a:off x="831850" y="572548"/>
+            <a:ext cx="7781544" cy="859055"/>
+          </a:xfrm>
+        </p:spPr>
+        <p:txBody>
+          <a:bodyPr/>
+          <a:lstStyle/>
+          <a:p>
+            <a:r>
+              <a:rPr lang="en-US" dirty="0"/>
+              <a:t>Example #7:</a:t>
+            </a:r>
+          </a:p>
+        </p:txBody>
+      </p:sp>
+      <p:sp>
+        <p:nvSpPr>
+          <p:cNvPr id="5" name="TextBox 4">
+            <a:extLst>
+              <a:ext uri="{FF2B5EF4-FFF2-40B4-BE49-F238E27FC236}">
+                <a16:creationId xmlns:a16="http://schemas.microsoft.com/office/drawing/2014/main" id="{113AB8C5-A10A-46A7-8E9B-86FB564077F1}"/>
+              </a:ext>
+            </a:extLst>
+          </p:cNvPr>
+          <p:cNvSpPr txBox="1"/>
+          <p:nvPr/>
+        </p:nvSpPr>
+        <p:spPr>
+          <a:xfrm>
+            <a:off x="8011486" y="214002"/>
+            <a:ext cx="3941259" cy="307777"/>
+          </a:xfrm>
+          <a:prstGeom prst="rect">
+            <a:avLst/>
+          </a:prstGeom>
+          <a:noFill/>
+        </p:spPr>
+        <p:txBody>
+          <a:bodyPr wrap="square" rtlCol="0">
+            <a:spAutoFit/>
+          </a:bodyPr>
+          <a:lstStyle/>
+          <a:p>
+            <a:r>
+              <a:rPr lang="en-US" sz="1400" i="1" dirty="0">
+                <a:solidFill>
+                  <a:schemeClr val="bg1"/>
+                </a:solidFill>
+                <a:latin typeface="Verdana" panose="020B0604030504040204" pitchFamily="34" charset="0"/>
+                <a:ea typeface="Verdana" panose="020B0604030504040204" pitchFamily="34" charset="0"/>
+              </a:rPr>
+              <a:t>Yay we get to code! </a:t>
+            </a:r>
+          </a:p>
+        </p:txBody>
+      </p:sp>
+      <p:sp>
+        <p:nvSpPr>
+          <p:cNvPr id="7" name="TextBox 6">
+            <a:extLst>
+              <a:ext uri="{FF2B5EF4-FFF2-40B4-BE49-F238E27FC236}">
+                <a16:creationId xmlns:a16="http://schemas.microsoft.com/office/drawing/2014/main" id="{6EF4944F-46C0-43F2-B4D7-059765C14E16}"/>
+              </a:ext>
+            </a:extLst>
+          </p:cNvPr>
+          <p:cNvSpPr txBox="1"/>
+          <p:nvPr/>
+        </p:nvSpPr>
+        <p:spPr>
+          <a:xfrm>
+            <a:off x="763398" y="2424310"/>
+            <a:ext cx="7474591" cy="369332"/>
+          </a:xfrm>
+          <a:prstGeom prst="rect">
+            <a:avLst/>
+          </a:prstGeom>
+          <a:noFill/>
+        </p:spPr>
+        <p:txBody>
+          <a:bodyPr wrap="square" rtlCol="0">
+            <a:spAutoFit/>
+          </a:bodyPr>
+          <a:lstStyle/>
+          <a:p>
+            <a:r>
+              <a:rPr lang="en-US" dirty="0">
+                <a:solidFill>
+                  <a:schemeClr val="bg1"/>
+                </a:solidFill>
+              </a:rPr>
+              <a:t>Wow… I can’t believe we got so far 😢😊</a:t>
+            </a:r>
+          </a:p>
+        </p:txBody>
+      </p:sp>
+    </p:spTree>
+    <p:extLst>
+      <p:ext uri="{BB962C8B-B14F-4D97-AF65-F5344CB8AC3E}">
+        <p14:creationId xmlns:p14="http://schemas.microsoft.com/office/powerpoint/2010/main" val="3960473153"/>
+      </p:ext>
+    </p:extLst>
+  </p:cSld>
+  <p:clrMapOvr>
+    <a:masterClrMapping/>
+  </p:clrMapOvr>
+</p:sld>
+</file>
+
+<file path=ppt/slides/slide18.xml><?xml version="1.0" encoding="utf-8"?>
 <p:sld xmlns:a="http://schemas.openxmlformats.org/drawingml/2006/main" xmlns:r="http://schemas.openxmlformats.org/officeDocument/2006/relationships" xmlns:p="http://schemas.openxmlformats.org/presentationml/2006/main">
   <p:cSld>
     <p:spTree>
@@ -30871,14 +31546,6 @@
 </file>
 
 <file path=customXml/item2.xml><?xml version="1.0" encoding="utf-8"?>
-<p:properties xmlns:p="http://schemas.microsoft.com/office/2006/metadata/properties" xmlns:xsi="http://www.w3.org/2001/XMLSchema-instance" xmlns:pc="http://schemas.microsoft.com/office/infopath/2007/PartnerControls">
-  <documentManagement>
-    <MediaServiceKeyPoints xmlns="2ebe0f63-38f6-4fcd-88f3-3e4828d93e66" xsi:nil="true"/>
-  </documentManagement>
-</p:properties>
-</file>
-
-<file path=customXml/item3.xml><?xml version="1.0" encoding="utf-8"?>
 <ct:contentTypeSchema xmlns:ct="http://schemas.microsoft.com/office/2006/metadata/contentType" xmlns:ma="http://schemas.microsoft.com/office/2006/metadata/properties/metaAttributes" ct:_="" ma:_="" ma:contentTypeName="Document" ma:contentTypeID="0x0101008B4442FBFE05774288CB847DC6EE13F4" ma:contentTypeVersion="4" ma:contentTypeDescription="Create a new document." ma:contentTypeScope="" ma:versionID="f2049d605bbc65dfa0cbcb46c6d2a32b">
   <xsd:schema xmlns:xsd="http://www.w3.org/2001/XMLSchema" xmlns:xs="http://www.w3.org/2001/XMLSchema" xmlns:p="http://schemas.microsoft.com/office/2006/metadata/properties" xmlns:ns3="2ebe0f63-38f6-4fcd-88f3-3e4828d93e66" targetNamespace="http://schemas.microsoft.com/office/2006/metadata/properties" ma:root="true" ma:fieldsID="0d18d22d2dc51f4710e99b0180813f7c" ns3:_="">
     <xsd:import namespace="2ebe0f63-38f6-4fcd-88f3-3e4828d93e66"/>
@@ -31024,6 +31691,14 @@
 </ct:contentTypeSchema>
 </file>
 
+<file path=customXml/item3.xml><?xml version="1.0" encoding="utf-8"?>
+<p:properties xmlns:p="http://schemas.microsoft.com/office/2006/metadata/properties" xmlns:xsi="http://www.w3.org/2001/XMLSchema-instance" xmlns:pc="http://schemas.microsoft.com/office/infopath/2007/PartnerControls">
+  <documentManagement>
+    <MediaServiceKeyPoints xmlns="2ebe0f63-38f6-4fcd-88f3-3e4828d93e66" xsi:nil="true"/>
+  </documentManagement>
+</p:properties>
+</file>
+
 <file path=customXml/itemProps1.xml><?xml version="1.0" encoding="utf-8"?>
 <ds:datastoreItem xmlns:ds="http://schemas.openxmlformats.org/officeDocument/2006/customXml" ds:itemID="{5B26E0C9-B2AA-42E6-97B6-E1B7D9EAF129}">
   <ds:schemaRefs>
@@ -31033,22 +31708,6 @@
 </file>
 
 <file path=customXml/itemProps2.xml><?xml version="1.0" encoding="utf-8"?>
-<ds:datastoreItem xmlns:ds="http://schemas.openxmlformats.org/officeDocument/2006/customXml" ds:itemID="{F5757914-1161-4661-9696-421FD6935CDD}">
-  <ds:schemaRefs>
-    <ds:schemaRef ds:uri="http://purl.org/dc/terms/"/>
-    <ds:schemaRef ds:uri="http://purl.org/dc/dcmitype/"/>
-    <ds:schemaRef ds:uri="http://schemas.microsoft.com/office/infopath/2007/PartnerControls"/>
-    <ds:schemaRef ds:uri="http://schemas.openxmlformats.org/package/2006/metadata/core-properties"/>
-    <ds:schemaRef ds:uri="2ebe0f63-38f6-4fcd-88f3-3e4828d93e66"/>
-    <ds:schemaRef ds:uri="http://schemas.microsoft.com/office/2006/documentManagement/types"/>
-    <ds:schemaRef ds:uri="http://purl.org/dc/elements/1.1/"/>
-    <ds:schemaRef ds:uri="http://schemas.microsoft.com/office/2006/metadata/properties"/>
-    <ds:schemaRef ds:uri="http://www.w3.org/XML/1998/namespace"/>
-  </ds:schemaRefs>
-</ds:datastoreItem>
-</file>
-
-<file path=customXml/itemProps3.xml><?xml version="1.0" encoding="utf-8"?>
 <ds:datastoreItem xmlns:ds="http://schemas.openxmlformats.org/officeDocument/2006/customXml" ds:itemID="{C1EA541C-64EB-44C1-9D01-02A99F2D7F8F}">
   <ds:schemaRefs>
     <ds:schemaRef ds:uri="http://schemas.microsoft.com/office/2006/metadata/contentType"/>
@@ -31064,4 +31723,20 @@
     <ds:schemaRef ds:uri="http://schemas.microsoft.com/internal/obd"/>
   </ds:schemaRefs>
 </ds:datastoreItem>
+</file>
+
+<file path=customXml/itemProps3.xml><?xml version="1.0" encoding="utf-8"?>
+<ds:datastoreItem xmlns:ds="http://schemas.openxmlformats.org/officeDocument/2006/customXml" ds:itemID="{F5757914-1161-4661-9696-421FD6935CDD}">
+  <ds:schemaRefs>
+    <ds:schemaRef ds:uri="http://purl.org/dc/terms/"/>
+    <ds:schemaRef ds:uri="http://purl.org/dc/dcmitype/"/>
+    <ds:schemaRef ds:uri="http://schemas.microsoft.com/office/infopath/2007/PartnerControls"/>
+    <ds:schemaRef ds:uri="http://schemas.openxmlformats.org/package/2006/metadata/core-properties"/>
+    <ds:schemaRef ds:uri="2ebe0f63-38f6-4fcd-88f3-3e4828d93e66"/>
+    <ds:schemaRef ds:uri="http://schemas.microsoft.com/office/2006/documentManagement/types"/>
+    <ds:schemaRef ds:uri="http://purl.org/dc/elements/1.1/"/>
+    <ds:schemaRef ds:uri="http://schemas.microsoft.com/office/2006/metadata/properties"/>
+    <ds:schemaRef ds:uri="http://www.w3.org/XML/1998/namespace"/>
+  </ds:schemaRefs>
+</ds:datastoreItem>
 </file>
</xml_diff>